<commit_message>
Added VPC Code files and related images
</commit_message>
<xml_diff>
--- a/Documents/P2CM diagrams.pptx
+++ b/Documents/P2CM diagrams.pptx
@@ -5,11 +5,14 @@
     <p:sldMasterId id="2147483648" r:id="rId1"/>
   </p:sldMasterIdLst>
   <p:notesMasterIdLst>
-    <p:notesMasterId r:id="rId4"/>
+    <p:notesMasterId r:id="rId7"/>
   </p:notesMasterIdLst>
   <p:sldIdLst>
     <p:sldId id="256" r:id="rId2"/>
-    <p:sldId id="257" r:id="rId3"/>
+    <p:sldId id="260" r:id="rId3"/>
+    <p:sldId id="259" r:id="rId4"/>
+    <p:sldId id="258" r:id="rId5"/>
+    <p:sldId id="257" r:id="rId6"/>
   </p:sldIdLst>
   <p:sldSz cx="12192000" cy="6858000"/>
   <p:notesSz cx="6858000" cy="9144000"/>
@@ -562,7 +565,7 @@
           <a:p>
             <a:fld id="{5D82C926-6AB7-F441-A0D7-96ECB7F5DA23}" type="slidenum">
               <a:rPr lang="en-US" smtClean="0"/>
-              <a:t>2</a:t>
+              <a:t>5</a:t>
             </a:fld>
             <a:endParaRPr lang="en-US"/>
           </a:p>
@@ -3844,6 +3847,2027 @@
         </p:blipFill>
         <p:spPr>
           <a:xfrm>
+            <a:off x="99423" y="795338"/>
+            <a:ext cx="1081088" cy="1081088"/>
+          </a:xfrm>
+          <a:prstGeom prst="rect">
+            <a:avLst/>
+          </a:prstGeom>
+        </p:spPr>
+      </p:pic>
+      <p:sp>
+        <p:nvSpPr>
+          <p:cNvPr id="11" name="Right Arrow 10">
+            <a:extLst>
+              <a:ext uri="{FF2B5EF4-FFF2-40B4-BE49-F238E27FC236}">
+                <a16:creationId xmlns:a16="http://schemas.microsoft.com/office/drawing/2014/main" id="{85571814-EF87-1C9F-55B0-761F5318FF4D}"/>
+              </a:ext>
+            </a:extLst>
+          </p:cNvPr>
+          <p:cNvSpPr/>
+          <p:nvPr/>
+        </p:nvSpPr>
+        <p:spPr>
+          <a:xfrm>
+            <a:off x="1167823" y="1248026"/>
+            <a:ext cx="435847" cy="287109"/>
+          </a:xfrm>
+          <a:prstGeom prst="rightArrow">
+            <a:avLst/>
+          </a:prstGeom>
+        </p:spPr>
+        <p:style>
+          <a:lnRef idx="2">
+            <a:schemeClr val="accent1">
+              <a:shade val="50000"/>
+            </a:schemeClr>
+          </a:lnRef>
+          <a:fillRef idx="1">
+            <a:schemeClr val="accent1"/>
+          </a:fillRef>
+          <a:effectRef idx="0">
+            <a:schemeClr val="accent1"/>
+          </a:effectRef>
+          <a:fontRef idx="minor">
+            <a:schemeClr val="lt1"/>
+          </a:fontRef>
+        </p:style>
+        <p:txBody>
+          <a:bodyPr rtlCol="0" anchor="ctr"/>
+          <a:lstStyle/>
+          <a:p>
+            <a:pPr algn="ctr"/>
+            <a:endParaRPr lang="en-US"/>
+          </a:p>
+        </p:txBody>
+      </p:sp>
+      <p:sp>
+        <p:nvSpPr>
+          <p:cNvPr id="12" name="Rounded Rectangle 11">
+            <a:extLst>
+              <a:ext uri="{FF2B5EF4-FFF2-40B4-BE49-F238E27FC236}">
+                <a16:creationId xmlns:a16="http://schemas.microsoft.com/office/drawing/2014/main" id="{A0B63E04-F3F4-501F-AC7C-CFD029B34420}"/>
+              </a:ext>
+            </a:extLst>
+          </p:cNvPr>
+          <p:cNvSpPr/>
+          <p:nvPr/>
+        </p:nvSpPr>
+        <p:spPr>
+          <a:xfrm>
+            <a:off x="1878142" y="934380"/>
+            <a:ext cx="1700213" cy="914400"/>
+          </a:xfrm>
+          <a:prstGeom prst="roundRect">
+            <a:avLst/>
+          </a:prstGeom>
+          <a:solidFill>
+            <a:schemeClr val="bg2">
+              <a:lumMod val="75000"/>
+            </a:schemeClr>
+          </a:solidFill>
+        </p:spPr>
+        <p:style>
+          <a:lnRef idx="2">
+            <a:schemeClr val="accent1">
+              <a:shade val="50000"/>
+            </a:schemeClr>
+          </a:lnRef>
+          <a:fillRef idx="1">
+            <a:schemeClr val="accent1"/>
+          </a:fillRef>
+          <a:effectRef idx="0">
+            <a:schemeClr val="accent1"/>
+          </a:effectRef>
+          <a:fontRef idx="minor">
+            <a:schemeClr val="lt1"/>
+          </a:fontRef>
+        </p:style>
+        <p:txBody>
+          <a:bodyPr rtlCol="0" anchor="ctr"/>
+          <a:lstStyle/>
+          <a:p>
+            <a:pPr algn="ctr"/>
+            <a:r>
+              <a:rPr lang="en-US" dirty="0"/>
+              <a:t>Data pre-Processing</a:t>
+            </a:r>
+          </a:p>
+          <a:p>
+            <a:pPr algn="ctr"/>
+            <a:endParaRPr lang="en-US" dirty="0"/>
+          </a:p>
+        </p:txBody>
+      </p:sp>
+      <p:pic>
+        <p:nvPicPr>
+          <p:cNvPr id="14" name="Graphic 13" descr="Paper with solid fill">
+            <a:extLst>
+              <a:ext uri="{FF2B5EF4-FFF2-40B4-BE49-F238E27FC236}">
+                <a16:creationId xmlns:a16="http://schemas.microsoft.com/office/drawing/2014/main" id="{3B114944-5647-B7B6-FEDE-F2EFC2318196}"/>
+              </a:ext>
+            </a:extLst>
+          </p:cNvPr>
+          <p:cNvPicPr>
+            <a:picLocks noChangeAspect="1"/>
+          </p:cNvPicPr>
+          <p:nvPr/>
+        </p:nvPicPr>
+        <p:blipFill>
+          <a:blip r:embed="rId4">
+            <a:extLst>
+              <a:ext uri="{96DAC541-7B7A-43D3-8B79-37D633B846F1}">
+                <asvg:svgBlip xmlns:asvg="http://schemas.microsoft.com/office/drawing/2016/SVG/main" r:embed="rId5"/>
+              </a:ext>
+            </a:extLst>
+          </a:blip>
+          <a:stretch>
+            <a:fillRect/>
+          </a:stretch>
+        </p:blipFill>
+        <p:spPr>
+          <a:xfrm>
+            <a:off x="4043212" y="770653"/>
+            <a:ext cx="1214436" cy="1214436"/>
+          </a:xfrm>
+          <a:prstGeom prst="rect">
+            <a:avLst/>
+          </a:prstGeom>
+        </p:spPr>
+      </p:pic>
+      <p:sp>
+        <p:nvSpPr>
+          <p:cNvPr id="15" name="Right Arrow 14">
+            <a:extLst>
+              <a:ext uri="{FF2B5EF4-FFF2-40B4-BE49-F238E27FC236}">
+                <a16:creationId xmlns:a16="http://schemas.microsoft.com/office/drawing/2014/main" id="{0890760D-EB73-043B-5120-7C487041B806}"/>
+              </a:ext>
+            </a:extLst>
+          </p:cNvPr>
+          <p:cNvSpPr/>
+          <p:nvPr/>
+        </p:nvSpPr>
+        <p:spPr>
+          <a:xfrm>
+            <a:off x="3705512" y="1275444"/>
+            <a:ext cx="483429" cy="259691"/>
+          </a:xfrm>
+          <a:prstGeom prst="rightArrow">
+            <a:avLst/>
+          </a:prstGeom>
+        </p:spPr>
+        <p:style>
+          <a:lnRef idx="2">
+            <a:schemeClr val="accent1">
+              <a:shade val="50000"/>
+            </a:schemeClr>
+          </a:lnRef>
+          <a:fillRef idx="1">
+            <a:schemeClr val="accent1"/>
+          </a:fillRef>
+          <a:effectRef idx="0">
+            <a:schemeClr val="accent1"/>
+          </a:effectRef>
+          <a:fontRef idx="minor">
+            <a:schemeClr val="lt1"/>
+          </a:fontRef>
+        </p:style>
+        <p:txBody>
+          <a:bodyPr rtlCol="0" anchor="ctr"/>
+          <a:lstStyle/>
+          <a:p>
+            <a:pPr algn="ctr"/>
+            <a:endParaRPr lang="en-US"/>
+          </a:p>
+        </p:txBody>
+      </p:sp>
+      <p:sp>
+        <p:nvSpPr>
+          <p:cNvPr id="25" name="Rounded Rectangle 24">
+            <a:extLst>
+              <a:ext uri="{FF2B5EF4-FFF2-40B4-BE49-F238E27FC236}">
+                <a16:creationId xmlns:a16="http://schemas.microsoft.com/office/drawing/2014/main" id="{9A760042-F91B-C4DE-DE8C-2332C4F13995}"/>
+              </a:ext>
+            </a:extLst>
+          </p:cNvPr>
+          <p:cNvSpPr/>
+          <p:nvPr/>
+        </p:nvSpPr>
+        <p:spPr>
+          <a:xfrm>
+            <a:off x="9585264" y="878682"/>
+            <a:ext cx="1700213" cy="914400"/>
+          </a:xfrm>
+          <a:prstGeom prst="roundRect">
+            <a:avLst/>
+          </a:prstGeom>
+          <a:solidFill>
+            <a:schemeClr val="bg2">
+              <a:lumMod val="75000"/>
+            </a:schemeClr>
+          </a:solidFill>
+        </p:spPr>
+        <p:style>
+          <a:lnRef idx="2">
+            <a:schemeClr val="accent1">
+              <a:shade val="50000"/>
+            </a:schemeClr>
+          </a:lnRef>
+          <a:fillRef idx="1">
+            <a:schemeClr val="accent1"/>
+          </a:fillRef>
+          <a:effectRef idx="0">
+            <a:schemeClr val="accent1"/>
+          </a:effectRef>
+          <a:fontRef idx="minor">
+            <a:schemeClr val="lt1"/>
+          </a:fontRef>
+        </p:style>
+        <p:txBody>
+          <a:bodyPr rtlCol="0" anchor="ctr"/>
+          <a:lstStyle/>
+          <a:p>
+            <a:pPr algn="ctr"/>
+            <a:r>
+              <a:rPr lang="en-US" dirty="0"/>
+              <a:t>Scoping Analysis</a:t>
+            </a:r>
+          </a:p>
+        </p:txBody>
+      </p:sp>
+      <p:sp>
+        <p:nvSpPr>
+          <p:cNvPr id="26" name="Rounded Rectangle 25">
+            <a:extLst>
+              <a:ext uri="{FF2B5EF4-FFF2-40B4-BE49-F238E27FC236}">
+                <a16:creationId xmlns:a16="http://schemas.microsoft.com/office/drawing/2014/main" id="{80287573-9FAF-9538-4274-27CD838DB9E3}"/>
+              </a:ext>
+            </a:extLst>
+          </p:cNvPr>
+          <p:cNvSpPr/>
+          <p:nvPr/>
+        </p:nvSpPr>
+        <p:spPr>
+          <a:xfrm>
+            <a:off x="3051689" y="2803739"/>
+            <a:ext cx="1700213" cy="914400"/>
+          </a:xfrm>
+          <a:prstGeom prst="roundRect">
+            <a:avLst/>
+          </a:prstGeom>
+          <a:solidFill>
+            <a:schemeClr val="bg2">
+              <a:lumMod val="75000"/>
+            </a:schemeClr>
+          </a:solidFill>
+        </p:spPr>
+        <p:style>
+          <a:lnRef idx="2">
+            <a:schemeClr val="accent1">
+              <a:shade val="50000"/>
+            </a:schemeClr>
+          </a:lnRef>
+          <a:fillRef idx="1">
+            <a:schemeClr val="accent1"/>
+          </a:fillRef>
+          <a:effectRef idx="0">
+            <a:schemeClr val="accent1"/>
+          </a:effectRef>
+          <a:fontRef idx="minor">
+            <a:schemeClr val="lt1"/>
+          </a:fontRef>
+        </p:style>
+        <p:txBody>
+          <a:bodyPr rtlCol="0" anchor="ctr"/>
+          <a:lstStyle/>
+          <a:p>
+            <a:pPr algn="ctr"/>
+            <a:r>
+              <a:rPr lang="en-US" dirty="0"/>
+              <a:t>Interpretation and Validation</a:t>
+            </a:r>
+          </a:p>
+        </p:txBody>
+      </p:sp>
+      <p:sp>
+        <p:nvSpPr>
+          <p:cNvPr id="32" name="TextBox 31">
+            <a:extLst>
+              <a:ext uri="{FF2B5EF4-FFF2-40B4-BE49-F238E27FC236}">
+                <a16:creationId xmlns:a16="http://schemas.microsoft.com/office/drawing/2014/main" id="{9D9360C0-B4BD-4240-8FBB-E5733097E5AC}"/>
+              </a:ext>
+            </a:extLst>
+          </p:cNvPr>
+          <p:cNvSpPr txBox="1"/>
+          <p:nvPr/>
+        </p:nvSpPr>
+        <p:spPr>
+          <a:xfrm>
+            <a:off x="481006" y="1998798"/>
+            <a:ext cx="1072601" cy="646331"/>
+          </a:xfrm>
+          <a:prstGeom prst="rect">
+            <a:avLst/>
+          </a:prstGeom>
+          <a:noFill/>
+        </p:spPr>
+        <p:txBody>
+          <a:bodyPr wrap="none" rtlCol="0">
+            <a:spAutoFit/>
+          </a:bodyPr>
+          <a:lstStyle/>
+          <a:p>
+            <a:r>
+              <a:rPr lang="en-US" dirty="0"/>
+              <a:t>Raw Data</a:t>
+            </a:r>
+          </a:p>
+          <a:p>
+            <a:endParaRPr lang="en-US" dirty="0"/>
+          </a:p>
+        </p:txBody>
+      </p:sp>
+      <p:sp>
+        <p:nvSpPr>
+          <p:cNvPr id="33" name="TextBox 32">
+            <a:extLst>
+              <a:ext uri="{FF2B5EF4-FFF2-40B4-BE49-F238E27FC236}">
+                <a16:creationId xmlns:a16="http://schemas.microsoft.com/office/drawing/2014/main" id="{EA992BA6-AFAB-0EF1-A47A-82A0CBC58730}"/>
+              </a:ext>
+            </a:extLst>
+          </p:cNvPr>
+          <p:cNvSpPr txBox="1"/>
+          <p:nvPr/>
+        </p:nvSpPr>
+        <p:spPr>
+          <a:xfrm>
+            <a:off x="3936774" y="1928085"/>
+            <a:ext cx="1475917" cy="646331"/>
+          </a:xfrm>
+          <a:prstGeom prst="rect">
+            <a:avLst/>
+          </a:prstGeom>
+          <a:noFill/>
+        </p:spPr>
+        <p:txBody>
+          <a:bodyPr wrap="none" rtlCol="0">
+            <a:spAutoFit/>
+          </a:bodyPr>
+          <a:lstStyle/>
+          <a:p>
+            <a:r>
+              <a:rPr lang="en-US" dirty="0"/>
+              <a:t>XES Event Log</a:t>
+            </a:r>
+          </a:p>
+          <a:p>
+            <a:endParaRPr lang="en-US" dirty="0"/>
+          </a:p>
+        </p:txBody>
+      </p:sp>
+      <p:sp>
+        <p:nvSpPr>
+          <p:cNvPr id="35" name="Left Arrow 34">
+            <a:extLst>
+              <a:ext uri="{FF2B5EF4-FFF2-40B4-BE49-F238E27FC236}">
+                <a16:creationId xmlns:a16="http://schemas.microsoft.com/office/drawing/2014/main" id="{309294A8-075B-053E-3E24-2CA961DD5AE6}"/>
+              </a:ext>
+            </a:extLst>
+          </p:cNvPr>
+          <p:cNvSpPr/>
+          <p:nvPr/>
+        </p:nvSpPr>
+        <p:spPr>
+          <a:xfrm>
+            <a:off x="4925270" y="3224161"/>
+            <a:ext cx="545487" cy="259692"/>
+          </a:xfrm>
+          <a:prstGeom prst="leftArrow">
+            <a:avLst/>
+          </a:prstGeom>
+        </p:spPr>
+        <p:style>
+          <a:lnRef idx="2">
+            <a:schemeClr val="accent1">
+              <a:shade val="50000"/>
+            </a:schemeClr>
+          </a:lnRef>
+          <a:fillRef idx="1">
+            <a:schemeClr val="accent1"/>
+          </a:fillRef>
+          <a:effectRef idx="0">
+            <a:schemeClr val="accent1"/>
+          </a:effectRef>
+          <a:fontRef idx="minor">
+            <a:schemeClr val="lt1"/>
+          </a:fontRef>
+        </p:style>
+        <p:txBody>
+          <a:bodyPr rtlCol="0" anchor="ctr"/>
+          <a:lstStyle/>
+          <a:p>
+            <a:pPr algn="ctr"/>
+            <a:endParaRPr lang="en-US"/>
+          </a:p>
+        </p:txBody>
+      </p:sp>
+      <p:sp>
+        <p:nvSpPr>
+          <p:cNvPr id="36" name="Left Arrow 35">
+            <a:extLst>
+              <a:ext uri="{FF2B5EF4-FFF2-40B4-BE49-F238E27FC236}">
+                <a16:creationId xmlns:a16="http://schemas.microsoft.com/office/drawing/2014/main" id="{D965D1BD-AD55-1E2D-0EAD-203A3E5E0B96}"/>
+              </a:ext>
+            </a:extLst>
+          </p:cNvPr>
+          <p:cNvSpPr/>
+          <p:nvPr/>
+        </p:nvSpPr>
+        <p:spPr>
+          <a:xfrm>
+            <a:off x="2298357" y="3224160"/>
+            <a:ext cx="505824" cy="259693"/>
+          </a:xfrm>
+          <a:prstGeom prst="leftArrow">
+            <a:avLst/>
+          </a:prstGeom>
+        </p:spPr>
+        <p:style>
+          <a:lnRef idx="2">
+            <a:schemeClr val="accent1">
+              <a:shade val="50000"/>
+            </a:schemeClr>
+          </a:lnRef>
+          <a:fillRef idx="1">
+            <a:schemeClr val="accent1"/>
+          </a:fillRef>
+          <a:effectRef idx="0">
+            <a:schemeClr val="accent1"/>
+          </a:effectRef>
+          <a:fontRef idx="minor">
+            <a:schemeClr val="lt1"/>
+          </a:fontRef>
+        </p:style>
+        <p:txBody>
+          <a:bodyPr rtlCol="0" anchor="ctr"/>
+          <a:lstStyle/>
+          <a:p>
+            <a:pPr algn="ctr"/>
+            <a:endParaRPr lang="en-US"/>
+          </a:p>
+        </p:txBody>
+      </p:sp>
+      <p:sp>
+        <p:nvSpPr>
+          <p:cNvPr id="39" name="Bevel 38">
+            <a:extLst>
+              <a:ext uri="{FF2B5EF4-FFF2-40B4-BE49-F238E27FC236}">
+                <a16:creationId xmlns:a16="http://schemas.microsoft.com/office/drawing/2014/main" id="{0A034E1A-5E16-A421-6ADC-15E9318C531C}"/>
+              </a:ext>
+            </a:extLst>
+          </p:cNvPr>
+          <p:cNvSpPr/>
+          <p:nvPr/>
+        </p:nvSpPr>
+        <p:spPr>
+          <a:xfrm>
+            <a:off x="202388" y="2803739"/>
+            <a:ext cx="1848461" cy="963897"/>
+          </a:xfrm>
+          <a:prstGeom prst="bevel">
+            <a:avLst/>
+          </a:prstGeom>
+          <a:solidFill>
+            <a:schemeClr val="bg2">
+              <a:lumMod val="50000"/>
+            </a:schemeClr>
+          </a:solidFill>
+        </p:spPr>
+        <p:style>
+          <a:lnRef idx="2">
+            <a:schemeClr val="accent1">
+              <a:shade val="50000"/>
+            </a:schemeClr>
+          </a:lnRef>
+          <a:fillRef idx="1">
+            <a:schemeClr val="accent1"/>
+          </a:fillRef>
+          <a:effectRef idx="0">
+            <a:schemeClr val="accent1"/>
+          </a:effectRef>
+          <a:fontRef idx="minor">
+            <a:schemeClr val="lt1"/>
+          </a:fontRef>
+        </p:style>
+        <p:txBody>
+          <a:bodyPr rtlCol="0" anchor="ctr"/>
+          <a:lstStyle/>
+          <a:p>
+            <a:pPr algn="ctr"/>
+            <a:r>
+              <a:rPr lang="en-US" dirty="0"/>
+              <a:t>Results</a:t>
+            </a:r>
+          </a:p>
+        </p:txBody>
+      </p:sp>
+      <p:sp>
+        <p:nvSpPr>
+          <p:cNvPr id="4" name="Round Diagonal Corner of Rectangle 3">
+            <a:extLst>
+              <a:ext uri="{FF2B5EF4-FFF2-40B4-BE49-F238E27FC236}">
+                <a16:creationId xmlns:a16="http://schemas.microsoft.com/office/drawing/2014/main" id="{3B46BBAD-EEAC-5FAD-514C-65FF2BF46F0D}"/>
+              </a:ext>
+            </a:extLst>
+          </p:cNvPr>
+          <p:cNvSpPr/>
+          <p:nvPr/>
+        </p:nvSpPr>
+        <p:spPr>
+          <a:xfrm>
+            <a:off x="5784352" y="770653"/>
+            <a:ext cx="2768539" cy="1414594"/>
+          </a:xfrm>
+          <a:prstGeom prst="round2DiagRect">
+            <a:avLst/>
+          </a:prstGeom>
+        </p:spPr>
+        <p:style>
+          <a:lnRef idx="1">
+            <a:schemeClr val="accent1"/>
+          </a:lnRef>
+          <a:fillRef idx="2">
+            <a:schemeClr val="accent1"/>
+          </a:fillRef>
+          <a:effectRef idx="1">
+            <a:schemeClr val="accent1"/>
+          </a:effectRef>
+          <a:fontRef idx="minor">
+            <a:schemeClr val="dk1"/>
+          </a:fontRef>
+        </p:style>
+        <p:txBody>
+          <a:bodyPr rtlCol="0" anchor="ctr"/>
+          <a:lstStyle/>
+          <a:p>
+            <a:pPr algn="ctr"/>
+            <a:r>
+              <a:rPr lang="en-US" b="1" dirty="0">
+                <a:solidFill>
+                  <a:schemeClr val="tx1"/>
+                </a:solidFill>
+                <a:latin typeface="Algerian" pitchFamily="82" charset="77"/>
+              </a:rPr>
+              <a:t>Automated Alpha Attribute Selection</a:t>
+            </a:r>
+          </a:p>
+          <a:p>
+            <a:pPr marL="285750" indent="-285750">
+              <a:buFont typeface="Arial" panose="020B0604020202020204" pitchFamily="34" charset="0"/>
+              <a:buChar char="•"/>
+            </a:pPr>
+            <a:r>
+              <a:rPr lang="en-US" dirty="0">
+                <a:solidFill>
+                  <a:schemeClr val="tx1"/>
+                </a:solidFill>
+              </a:rPr>
+              <a:t>Rank Trace Attributes</a:t>
+            </a:r>
+          </a:p>
+          <a:p>
+            <a:pPr marL="285750" indent="-285750">
+              <a:buFont typeface="Arial" panose="020B0604020202020204" pitchFamily="34" charset="0"/>
+              <a:buChar char="•"/>
+            </a:pPr>
+            <a:r>
+              <a:rPr lang="en-US" dirty="0">
+                <a:solidFill>
+                  <a:schemeClr val="tx1"/>
+                </a:solidFill>
+              </a:rPr>
+              <a:t>Instantiating new Alpha 	Attributes</a:t>
+            </a:r>
+          </a:p>
+        </p:txBody>
+      </p:sp>
+      <p:sp>
+        <p:nvSpPr>
+          <p:cNvPr id="5" name="Round Diagonal Corner of Rectangle 4">
+            <a:extLst>
+              <a:ext uri="{FF2B5EF4-FFF2-40B4-BE49-F238E27FC236}">
+                <a16:creationId xmlns:a16="http://schemas.microsoft.com/office/drawing/2014/main" id="{42200D35-F917-8797-245A-E9BC2AF8DB53}"/>
+              </a:ext>
+            </a:extLst>
+          </p:cNvPr>
+          <p:cNvSpPr/>
+          <p:nvPr/>
+        </p:nvSpPr>
+        <p:spPr>
+          <a:xfrm>
+            <a:off x="5822902" y="2597264"/>
+            <a:ext cx="2768539" cy="1414594"/>
+          </a:xfrm>
+          <a:prstGeom prst="round2DiagRect">
+            <a:avLst/>
+          </a:prstGeom>
+        </p:spPr>
+        <p:style>
+          <a:lnRef idx="1">
+            <a:schemeClr val="accent1"/>
+          </a:lnRef>
+          <a:fillRef idx="2">
+            <a:schemeClr val="accent1"/>
+          </a:fillRef>
+          <a:effectRef idx="1">
+            <a:schemeClr val="accent1"/>
+          </a:effectRef>
+          <a:fontRef idx="minor">
+            <a:schemeClr val="dk1"/>
+          </a:fontRef>
+        </p:style>
+        <p:txBody>
+          <a:bodyPr rtlCol="0" anchor="ctr"/>
+          <a:lstStyle/>
+          <a:p>
+            <a:endParaRPr lang="en-US" b="1" dirty="0">
+              <a:solidFill>
+                <a:schemeClr val="tx1"/>
+              </a:solidFill>
+              <a:latin typeface="Algerian" pitchFamily="82" charset="77"/>
+            </a:endParaRPr>
+          </a:p>
+          <a:p>
+            <a:r>
+              <a:rPr lang="en-US" b="1" dirty="0">
+                <a:solidFill>
+                  <a:schemeClr val="tx1"/>
+                </a:solidFill>
+                <a:latin typeface="Algerian" pitchFamily="82" charset="77"/>
+              </a:rPr>
+              <a:t>In Depth Comparison</a:t>
+            </a:r>
+          </a:p>
+          <a:p>
+            <a:pPr marL="285750" indent="-285750">
+              <a:buFont typeface="Arial" panose="020B0604020202020204" pitchFamily="34" charset="0"/>
+              <a:buChar char="•"/>
+            </a:pPr>
+            <a:r>
+              <a:rPr lang="en-US" dirty="0">
+                <a:solidFill>
+                  <a:schemeClr val="tx1"/>
+                </a:solidFill>
+              </a:rPr>
+              <a:t>Stochastic insights into sub-log differences</a:t>
+            </a:r>
+          </a:p>
+          <a:p>
+            <a:endParaRPr lang="en-US" dirty="0"/>
+          </a:p>
+        </p:txBody>
+      </p:sp>
+      <p:sp>
+        <p:nvSpPr>
+          <p:cNvPr id="7" name="Round Diagonal Corner of Rectangle 6">
+            <a:extLst>
+              <a:ext uri="{FF2B5EF4-FFF2-40B4-BE49-F238E27FC236}">
+                <a16:creationId xmlns:a16="http://schemas.microsoft.com/office/drawing/2014/main" id="{994DF4A7-2050-9BD4-476E-F281E73693FA}"/>
+              </a:ext>
+            </a:extLst>
+          </p:cNvPr>
+          <p:cNvSpPr/>
+          <p:nvPr/>
+        </p:nvSpPr>
+        <p:spPr>
+          <a:xfrm>
+            <a:off x="9310792" y="2579826"/>
+            <a:ext cx="2768539" cy="1414594"/>
+          </a:xfrm>
+          <a:prstGeom prst="round2DiagRect">
+            <a:avLst/>
+          </a:prstGeom>
+        </p:spPr>
+        <p:style>
+          <a:lnRef idx="1">
+            <a:schemeClr val="accent1"/>
+          </a:lnRef>
+          <a:fillRef idx="2">
+            <a:schemeClr val="accent1"/>
+          </a:fillRef>
+          <a:effectRef idx="1">
+            <a:schemeClr val="accent1"/>
+          </a:effectRef>
+          <a:fontRef idx="minor">
+            <a:schemeClr val="dk1"/>
+          </a:fontRef>
+        </p:style>
+        <p:txBody>
+          <a:bodyPr rtlCol="0" anchor="ctr"/>
+          <a:lstStyle/>
+          <a:p>
+            <a:r>
+              <a:rPr lang="en-US" dirty="0">
+                <a:solidFill>
+                  <a:schemeClr val="tx1"/>
+                </a:solidFill>
+                <a:latin typeface="Algerian" pitchFamily="82" charset="77"/>
+              </a:rPr>
+              <a:t>Identifying Comparable Sub-logs</a:t>
+            </a:r>
+          </a:p>
+          <a:p>
+            <a:pPr marL="342900" indent="-342900">
+              <a:buFont typeface="Arial" panose="020B0604020202020204" pitchFamily="34" charset="0"/>
+              <a:buChar char="•"/>
+            </a:pPr>
+            <a:r>
+              <a:rPr lang="en-US" dirty="0">
+                <a:solidFill>
+                  <a:schemeClr val="tx1"/>
+                </a:solidFill>
+              </a:rPr>
+              <a:t>Stochastic Clustering</a:t>
+            </a:r>
+          </a:p>
+          <a:p>
+            <a:pPr marL="342900" indent="-342900">
+              <a:buFont typeface="Arial" panose="020B0604020202020204" pitchFamily="34" charset="0"/>
+              <a:buChar char="•"/>
+            </a:pPr>
+            <a:r>
+              <a:rPr lang="en-US" dirty="0">
+                <a:solidFill>
+                  <a:schemeClr val="tx1"/>
+                </a:solidFill>
+              </a:rPr>
+              <a:t>Pair Comparison</a:t>
+            </a:r>
+          </a:p>
+        </p:txBody>
+      </p:sp>
+      <p:sp>
+        <p:nvSpPr>
+          <p:cNvPr id="8" name="Right Arrow 7">
+            <a:extLst>
+              <a:ext uri="{FF2B5EF4-FFF2-40B4-BE49-F238E27FC236}">
+                <a16:creationId xmlns:a16="http://schemas.microsoft.com/office/drawing/2014/main" id="{582F014A-606A-547D-E4B0-D77F02BBACCA}"/>
+              </a:ext>
+            </a:extLst>
+          </p:cNvPr>
+          <p:cNvSpPr/>
+          <p:nvPr/>
+        </p:nvSpPr>
+        <p:spPr>
+          <a:xfrm>
+            <a:off x="5235083" y="1248026"/>
+            <a:ext cx="483429" cy="259691"/>
+          </a:xfrm>
+          <a:prstGeom prst="rightArrow">
+            <a:avLst/>
+          </a:prstGeom>
+        </p:spPr>
+        <p:style>
+          <a:lnRef idx="2">
+            <a:schemeClr val="accent1">
+              <a:shade val="50000"/>
+            </a:schemeClr>
+          </a:lnRef>
+          <a:fillRef idx="1">
+            <a:schemeClr val="accent1"/>
+          </a:fillRef>
+          <a:effectRef idx="0">
+            <a:schemeClr val="accent1"/>
+          </a:effectRef>
+          <a:fontRef idx="minor">
+            <a:schemeClr val="lt1"/>
+          </a:fontRef>
+        </p:style>
+        <p:txBody>
+          <a:bodyPr rtlCol="0" anchor="ctr"/>
+          <a:lstStyle/>
+          <a:p>
+            <a:pPr algn="ctr"/>
+            <a:endParaRPr lang="en-US"/>
+          </a:p>
+        </p:txBody>
+      </p:sp>
+      <p:sp>
+        <p:nvSpPr>
+          <p:cNvPr id="10" name="Right Arrow 9">
+            <a:extLst>
+              <a:ext uri="{FF2B5EF4-FFF2-40B4-BE49-F238E27FC236}">
+                <a16:creationId xmlns:a16="http://schemas.microsoft.com/office/drawing/2014/main" id="{BB93403E-A050-446F-0A8B-BB9E0C6B939F}"/>
+              </a:ext>
+            </a:extLst>
+          </p:cNvPr>
+          <p:cNvSpPr/>
+          <p:nvPr/>
+        </p:nvSpPr>
+        <p:spPr>
+          <a:xfrm>
+            <a:off x="8827363" y="1275444"/>
+            <a:ext cx="483429" cy="259691"/>
+          </a:xfrm>
+          <a:prstGeom prst="rightArrow">
+            <a:avLst/>
+          </a:prstGeom>
+        </p:spPr>
+        <p:style>
+          <a:lnRef idx="2">
+            <a:schemeClr val="accent1">
+              <a:shade val="50000"/>
+            </a:schemeClr>
+          </a:lnRef>
+          <a:fillRef idx="1">
+            <a:schemeClr val="accent1"/>
+          </a:fillRef>
+          <a:effectRef idx="0">
+            <a:schemeClr val="accent1"/>
+          </a:effectRef>
+          <a:fontRef idx="minor">
+            <a:schemeClr val="lt1"/>
+          </a:fontRef>
+        </p:style>
+        <p:txBody>
+          <a:bodyPr rtlCol="0" anchor="ctr"/>
+          <a:lstStyle/>
+          <a:p>
+            <a:pPr algn="ctr"/>
+            <a:endParaRPr lang="en-US"/>
+          </a:p>
+        </p:txBody>
+      </p:sp>
+      <p:sp>
+        <p:nvSpPr>
+          <p:cNvPr id="13" name="Right Arrow 12">
+            <a:extLst>
+              <a:ext uri="{FF2B5EF4-FFF2-40B4-BE49-F238E27FC236}">
+                <a16:creationId xmlns:a16="http://schemas.microsoft.com/office/drawing/2014/main" id="{A283CC05-2DFE-DDE3-B977-ADF7F9B478AE}"/>
+              </a:ext>
+            </a:extLst>
+          </p:cNvPr>
+          <p:cNvSpPr/>
+          <p:nvPr/>
+        </p:nvSpPr>
+        <p:spPr>
+          <a:xfrm rot="5400000">
+            <a:off x="10323502" y="2082948"/>
+            <a:ext cx="483429" cy="259691"/>
+          </a:xfrm>
+          <a:prstGeom prst="rightArrow">
+            <a:avLst/>
+          </a:prstGeom>
+        </p:spPr>
+        <p:style>
+          <a:lnRef idx="2">
+            <a:schemeClr val="accent1">
+              <a:shade val="50000"/>
+            </a:schemeClr>
+          </a:lnRef>
+          <a:fillRef idx="1">
+            <a:schemeClr val="accent1"/>
+          </a:fillRef>
+          <a:effectRef idx="0">
+            <a:schemeClr val="accent1"/>
+          </a:effectRef>
+          <a:fontRef idx="minor">
+            <a:schemeClr val="lt1"/>
+          </a:fontRef>
+        </p:style>
+        <p:txBody>
+          <a:bodyPr rtlCol="0" anchor="ctr"/>
+          <a:lstStyle/>
+          <a:p>
+            <a:pPr algn="ctr"/>
+            <a:endParaRPr lang="en-US"/>
+          </a:p>
+        </p:txBody>
+      </p:sp>
+      <p:sp>
+        <p:nvSpPr>
+          <p:cNvPr id="17" name="Right Arrow 16">
+            <a:extLst>
+              <a:ext uri="{FF2B5EF4-FFF2-40B4-BE49-F238E27FC236}">
+                <a16:creationId xmlns:a16="http://schemas.microsoft.com/office/drawing/2014/main" id="{153D0789-F124-FBDF-D9F3-F70B70E543C8}"/>
+              </a:ext>
+            </a:extLst>
+          </p:cNvPr>
+          <p:cNvSpPr/>
+          <p:nvPr/>
+        </p:nvSpPr>
+        <p:spPr>
+          <a:xfrm rot="10800000">
+            <a:off x="8709402" y="3177632"/>
+            <a:ext cx="483429" cy="259691"/>
+          </a:xfrm>
+          <a:prstGeom prst="rightArrow">
+            <a:avLst/>
+          </a:prstGeom>
+        </p:spPr>
+        <p:style>
+          <a:lnRef idx="2">
+            <a:schemeClr val="accent1">
+              <a:shade val="50000"/>
+            </a:schemeClr>
+          </a:lnRef>
+          <a:fillRef idx="1">
+            <a:schemeClr val="accent1"/>
+          </a:fillRef>
+          <a:effectRef idx="0">
+            <a:schemeClr val="accent1"/>
+          </a:effectRef>
+          <a:fontRef idx="minor">
+            <a:schemeClr val="lt1"/>
+          </a:fontRef>
+        </p:style>
+        <p:txBody>
+          <a:bodyPr rtlCol="0" anchor="ctr"/>
+          <a:lstStyle/>
+          <a:p>
+            <a:pPr algn="ctr"/>
+            <a:endParaRPr lang="en-US"/>
+          </a:p>
+        </p:txBody>
+      </p:sp>
+    </p:spTree>
+    <p:extLst>
+      <p:ext uri="{BB962C8B-B14F-4D97-AF65-F5344CB8AC3E}">
+        <p14:creationId xmlns:p14="http://schemas.microsoft.com/office/powerpoint/2010/main" val="1860000131"/>
+      </p:ext>
+    </p:extLst>
+  </p:cSld>
+  <p:clrMapOvr>
+    <a:masterClrMapping/>
+  </p:clrMapOvr>
+</p:sld>
+</file>
+
+<file path=ppt/slides/slide2.xml><?xml version="1.0" encoding="utf-8"?>
+<p:sld xmlns:a="http://schemas.openxmlformats.org/drawingml/2006/main" xmlns:r="http://schemas.openxmlformats.org/officeDocument/2006/relationships" xmlns:p="http://schemas.openxmlformats.org/presentationml/2006/main">
+  <p:cSld>
+    <p:spTree>
+      <p:nvGrpSpPr>
+        <p:cNvPr id="1" name=""/>
+        <p:cNvGrpSpPr/>
+        <p:nvPr/>
+      </p:nvGrpSpPr>
+      <p:grpSpPr>
+        <a:xfrm>
+          <a:off x="0" y="0"/>
+          <a:ext cx="0" cy="0"/>
+          <a:chOff x="0" y="0"/>
+          <a:chExt cx="0" cy="0"/>
+        </a:xfrm>
+      </p:grpSpPr>
+      <p:pic>
+        <p:nvPicPr>
+          <p:cNvPr id="6" name="Graphic 5" descr="Database outline">
+            <a:extLst>
+              <a:ext uri="{FF2B5EF4-FFF2-40B4-BE49-F238E27FC236}">
+                <a16:creationId xmlns:a16="http://schemas.microsoft.com/office/drawing/2014/main" id="{EC56AB9D-7CB7-0505-6D85-5BF483485889}"/>
+              </a:ext>
+            </a:extLst>
+          </p:cNvPr>
+          <p:cNvPicPr>
+            <a:picLocks noChangeAspect="1"/>
+          </p:cNvPicPr>
+          <p:nvPr/>
+        </p:nvPicPr>
+        <p:blipFill>
+          <a:blip r:embed="rId2">
+            <a:extLst>
+              <a:ext uri="{96DAC541-7B7A-43D3-8B79-37D633B846F1}">
+                <asvg:svgBlip xmlns:asvg="http://schemas.microsoft.com/office/drawing/2016/SVG/main" r:embed="rId3"/>
+              </a:ext>
+            </a:extLst>
+          </a:blip>
+          <a:stretch>
+            <a:fillRect/>
+          </a:stretch>
+        </p:blipFill>
+        <p:spPr>
+          <a:xfrm>
+            <a:off x="332576" y="937406"/>
+            <a:ext cx="1081088" cy="1081088"/>
+          </a:xfrm>
+          <a:prstGeom prst="rect">
+            <a:avLst/>
+          </a:prstGeom>
+        </p:spPr>
+      </p:pic>
+      <p:sp>
+        <p:nvSpPr>
+          <p:cNvPr id="11" name="Right Arrow 10">
+            <a:extLst>
+              <a:ext uri="{FF2B5EF4-FFF2-40B4-BE49-F238E27FC236}">
+                <a16:creationId xmlns:a16="http://schemas.microsoft.com/office/drawing/2014/main" id="{85571814-EF87-1C9F-55B0-761F5318FF4D}"/>
+              </a:ext>
+            </a:extLst>
+          </p:cNvPr>
+          <p:cNvSpPr/>
+          <p:nvPr/>
+        </p:nvSpPr>
+        <p:spPr>
+          <a:xfrm>
+            <a:off x="1404147" y="1467758"/>
+            <a:ext cx="591621" cy="259693"/>
+          </a:xfrm>
+          <a:prstGeom prst="rightArrow">
+            <a:avLst/>
+          </a:prstGeom>
+          <a:solidFill>
+            <a:schemeClr val="tx1"/>
+          </a:solidFill>
+        </p:spPr>
+        <p:style>
+          <a:lnRef idx="2">
+            <a:schemeClr val="accent1">
+              <a:shade val="50000"/>
+            </a:schemeClr>
+          </a:lnRef>
+          <a:fillRef idx="1">
+            <a:schemeClr val="accent1"/>
+          </a:fillRef>
+          <a:effectRef idx="0">
+            <a:schemeClr val="accent1"/>
+          </a:effectRef>
+          <a:fontRef idx="minor">
+            <a:schemeClr val="lt1"/>
+          </a:fontRef>
+        </p:style>
+        <p:txBody>
+          <a:bodyPr rtlCol="0" anchor="ctr"/>
+          <a:lstStyle/>
+          <a:p>
+            <a:pPr algn="ctr"/>
+            <a:endParaRPr lang="en-US"/>
+          </a:p>
+        </p:txBody>
+      </p:sp>
+      <p:sp>
+        <p:nvSpPr>
+          <p:cNvPr id="12" name="Rounded Rectangle 11">
+            <a:extLst>
+              <a:ext uri="{FF2B5EF4-FFF2-40B4-BE49-F238E27FC236}">
+                <a16:creationId xmlns:a16="http://schemas.microsoft.com/office/drawing/2014/main" id="{A0B63E04-F3F4-501F-AC7C-CFD029B34420}"/>
+              </a:ext>
+            </a:extLst>
+          </p:cNvPr>
+          <p:cNvSpPr/>
+          <p:nvPr/>
+        </p:nvSpPr>
+        <p:spPr>
+          <a:xfrm>
+            <a:off x="2187396" y="1050516"/>
+            <a:ext cx="1820844" cy="967977"/>
+          </a:xfrm>
+          <a:prstGeom prst="roundRect">
+            <a:avLst/>
+          </a:prstGeom>
+        </p:spPr>
+        <p:style>
+          <a:lnRef idx="1">
+            <a:schemeClr val="accent3"/>
+          </a:lnRef>
+          <a:fillRef idx="2">
+            <a:schemeClr val="accent3"/>
+          </a:fillRef>
+          <a:effectRef idx="1">
+            <a:schemeClr val="accent3"/>
+          </a:effectRef>
+          <a:fontRef idx="minor">
+            <a:schemeClr val="dk1"/>
+          </a:fontRef>
+        </p:style>
+        <p:txBody>
+          <a:bodyPr rtlCol="0" anchor="ctr"/>
+          <a:lstStyle/>
+          <a:p>
+            <a:pPr algn="ctr"/>
+            <a:endParaRPr lang="en-US" dirty="0">
+              <a:solidFill>
+                <a:schemeClr val="tx1"/>
+              </a:solidFill>
+            </a:endParaRPr>
+          </a:p>
+          <a:p>
+            <a:pPr algn="ctr"/>
+            <a:r>
+              <a:rPr lang="en-US" dirty="0">
+                <a:solidFill>
+                  <a:schemeClr val="tx1"/>
+                </a:solidFill>
+              </a:rPr>
+              <a:t>Data pre-Processing</a:t>
+            </a:r>
+          </a:p>
+          <a:p>
+            <a:pPr algn="ctr"/>
+            <a:endParaRPr lang="en-US" dirty="0">
+              <a:solidFill>
+                <a:schemeClr val="tx1"/>
+              </a:solidFill>
+            </a:endParaRPr>
+          </a:p>
+        </p:txBody>
+      </p:sp>
+      <p:pic>
+        <p:nvPicPr>
+          <p:cNvPr id="14" name="Graphic 13" descr="Paper with solid fill">
+            <a:extLst>
+              <a:ext uri="{FF2B5EF4-FFF2-40B4-BE49-F238E27FC236}">
+                <a16:creationId xmlns:a16="http://schemas.microsoft.com/office/drawing/2014/main" id="{3B114944-5647-B7B6-FEDE-F2EFC2318196}"/>
+              </a:ext>
+            </a:extLst>
+          </p:cNvPr>
+          <p:cNvPicPr>
+            <a:picLocks noChangeAspect="1"/>
+          </p:cNvPicPr>
+          <p:nvPr/>
+        </p:nvPicPr>
+        <p:blipFill>
+          <a:blip r:embed="rId4">
+            <a:extLst>
+              <a:ext uri="{96DAC541-7B7A-43D3-8B79-37D633B846F1}">
+                <asvg:svgBlip xmlns:asvg="http://schemas.microsoft.com/office/drawing/2016/SVG/main" r:embed="rId5"/>
+              </a:ext>
+            </a:extLst>
+          </a:blip>
+          <a:stretch>
+            <a:fillRect/>
+          </a:stretch>
+        </p:blipFill>
+        <p:spPr>
+          <a:xfrm>
+            <a:off x="4451045" y="1021817"/>
+            <a:ext cx="914400" cy="914400"/>
+          </a:xfrm>
+          <a:prstGeom prst="rect">
+            <a:avLst/>
+          </a:prstGeom>
+        </p:spPr>
+      </p:pic>
+      <p:sp>
+        <p:nvSpPr>
+          <p:cNvPr id="25" name="Rounded Rectangle 24">
+            <a:extLst>
+              <a:ext uri="{FF2B5EF4-FFF2-40B4-BE49-F238E27FC236}">
+                <a16:creationId xmlns:a16="http://schemas.microsoft.com/office/drawing/2014/main" id="{9A760042-F91B-C4DE-DE8C-2332C4F13995}"/>
+              </a:ext>
+            </a:extLst>
+          </p:cNvPr>
+          <p:cNvSpPr/>
+          <p:nvPr/>
+        </p:nvSpPr>
+        <p:spPr>
+          <a:xfrm>
+            <a:off x="9533271" y="1015971"/>
+            <a:ext cx="2419897" cy="903574"/>
+          </a:xfrm>
+          <a:prstGeom prst="roundRect">
+            <a:avLst/>
+          </a:prstGeom>
+        </p:spPr>
+        <p:style>
+          <a:lnRef idx="1">
+            <a:schemeClr val="accent3"/>
+          </a:lnRef>
+          <a:fillRef idx="2">
+            <a:schemeClr val="accent3"/>
+          </a:fillRef>
+          <a:effectRef idx="1">
+            <a:schemeClr val="accent3"/>
+          </a:effectRef>
+          <a:fontRef idx="minor">
+            <a:schemeClr val="dk1"/>
+          </a:fontRef>
+        </p:style>
+        <p:txBody>
+          <a:bodyPr rtlCol="0" anchor="ctr"/>
+          <a:lstStyle/>
+          <a:p>
+            <a:pPr algn="ctr"/>
+            <a:r>
+              <a:rPr lang="en-US" dirty="0">
+                <a:solidFill>
+                  <a:schemeClr val="tx1"/>
+                </a:solidFill>
+              </a:rPr>
+              <a:t>Scoping Analysis</a:t>
+            </a:r>
+          </a:p>
+        </p:txBody>
+      </p:sp>
+      <p:sp>
+        <p:nvSpPr>
+          <p:cNvPr id="26" name="Rounded Rectangle 25">
+            <a:extLst>
+              <a:ext uri="{FF2B5EF4-FFF2-40B4-BE49-F238E27FC236}">
+                <a16:creationId xmlns:a16="http://schemas.microsoft.com/office/drawing/2014/main" id="{80287573-9FAF-9538-4274-27CD838DB9E3}"/>
+              </a:ext>
+            </a:extLst>
+          </p:cNvPr>
+          <p:cNvSpPr/>
+          <p:nvPr/>
+        </p:nvSpPr>
+        <p:spPr>
+          <a:xfrm>
+            <a:off x="2145228" y="2817134"/>
+            <a:ext cx="2103519" cy="914400"/>
+          </a:xfrm>
+          <a:prstGeom prst="roundRect">
+            <a:avLst/>
+          </a:prstGeom>
+        </p:spPr>
+        <p:style>
+          <a:lnRef idx="1">
+            <a:schemeClr val="accent3"/>
+          </a:lnRef>
+          <a:fillRef idx="2">
+            <a:schemeClr val="accent3"/>
+          </a:fillRef>
+          <a:effectRef idx="1">
+            <a:schemeClr val="accent3"/>
+          </a:effectRef>
+          <a:fontRef idx="minor">
+            <a:schemeClr val="dk1"/>
+          </a:fontRef>
+        </p:style>
+        <p:txBody>
+          <a:bodyPr rtlCol="0" anchor="ctr"/>
+          <a:lstStyle/>
+          <a:p>
+            <a:pPr algn="ctr"/>
+            <a:r>
+              <a:rPr lang="en-US" dirty="0">
+                <a:solidFill>
+                  <a:schemeClr val="tx1"/>
+                </a:solidFill>
+              </a:rPr>
+              <a:t>Interpretation and Validation</a:t>
+            </a:r>
+          </a:p>
+        </p:txBody>
+      </p:sp>
+      <p:sp>
+        <p:nvSpPr>
+          <p:cNvPr id="32" name="TextBox 31">
+            <a:extLst>
+              <a:ext uri="{FF2B5EF4-FFF2-40B4-BE49-F238E27FC236}">
+                <a16:creationId xmlns:a16="http://schemas.microsoft.com/office/drawing/2014/main" id="{9D9360C0-B4BD-4240-8FBB-E5733097E5AC}"/>
+              </a:ext>
+            </a:extLst>
+          </p:cNvPr>
+          <p:cNvSpPr txBox="1"/>
+          <p:nvPr/>
+        </p:nvSpPr>
+        <p:spPr>
+          <a:xfrm>
+            <a:off x="369041" y="1937041"/>
+            <a:ext cx="1072601" cy="646331"/>
+          </a:xfrm>
+          <a:prstGeom prst="rect">
+            <a:avLst/>
+          </a:prstGeom>
+          <a:noFill/>
+        </p:spPr>
+        <p:txBody>
+          <a:bodyPr wrap="none" rtlCol="0">
+            <a:spAutoFit/>
+          </a:bodyPr>
+          <a:lstStyle/>
+          <a:p>
+            <a:r>
+              <a:rPr lang="en-US" dirty="0"/>
+              <a:t>Raw Data</a:t>
+            </a:r>
+          </a:p>
+          <a:p>
+            <a:endParaRPr lang="en-US" dirty="0"/>
+          </a:p>
+        </p:txBody>
+      </p:sp>
+      <p:sp>
+        <p:nvSpPr>
+          <p:cNvPr id="33" name="TextBox 32">
+            <a:extLst>
+              <a:ext uri="{FF2B5EF4-FFF2-40B4-BE49-F238E27FC236}">
+                <a16:creationId xmlns:a16="http://schemas.microsoft.com/office/drawing/2014/main" id="{EA992BA6-AFAB-0EF1-A47A-82A0CBC58730}"/>
+              </a:ext>
+            </a:extLst>
+          </p:cNvPr>
+          <p:cNvSpPr txBox="1"/>
+          <p:nvPr/>
+        </p:nvSpPr>
+        <p:spPr>
+          <a:xfrm>
+            <a:off x="4164751" y="1930371"/>
+            <a:ext cx="1475917" cy="646331"/>
+          </a:xfrm>
+          <a:prstGeom prst="rect">
+            <a:avLst/>
+          </a:prstGeom>
+          <a:noFill/>
+        </p:spPr>
+        <p:txBody>
+          <a:bodyPr wrap="none" rtlCol="0">
+            <a:spAutoFit/>
+          </a:bodyPr>
+          <a:lstStyle/>
+          <a:p>
+            <a:r>
+              <a:rPr lang="en-US" dirty="0"/>
+              <a:t>XES Event Log</a:t>
+            </a:r>
+          </a:p>
+          <a:p>
+            <a:endParaRPr lang="en-US" dirty="0"/>
+          </a:p>
+        </p:txBody>
+      </p:sp>
+      <p:sp>
+        <p:nvSpPr>
+          <p:cNvPr id="4" name="Round Diagonal Corner of Rectangle 3">
+            <a:extLst>
+              <a:ext uri="{FF2B5EF4-FFF2-40B4-BE49-F238E27FC236}">
+                <a16:creationId xmlns:a16="http://schemas.microsoft.com/office/drawing/2014/main" id="{3B46BBAD-EEAC-5FAD-514C-65FF2BF46F0D}"/>
+              </a:ext>
+            </a:extLst>
+          </p:cNvPr>
+          <p:cNvSpPr/>
+          <p:nvPr/>
+        </p:nvSpPr>
+        <p:spPr>
+          <a:xfrm>
+            <a:off x="5784352" y="770653"/>
+            <a:ext cx="2768539" cy="1414594"/>
+          </a:xfrm>
+          <a:prstGeom prst="round2DiagRect">
+            <a:avLst/>
+          </a:prstGeom>
+        </p:spPr>
+        <p:style>
+          <a:lnRef idx="1">
+            <a:schemeClr val="dk1"/>
+          </a:lnRef>
+          <a:fillRef idx="2">
+            <a:schemeClr val="dk1"/>
+          </a:fillRef>
+          <a:effectRef idx="1">
+            <a:schemeClr val="dk1"/>
+          </a:effectRef>
+          <a:fontRef idx="minor">
+            <a:schemeClr val="dk1"/>
+          </a:fontRef>
+        </p:style>
+        <p:txBody>
+          <a:bodyPr rtlCol="0" anchor="ctr"/>
+          <a:lstStyle/>
+          <a:p>
+            <a:r>
+              <a:rPr lang="en-US" b="1" dirty="0">
+                <a:solidFill>
+                  <a:schemeClr val="tx1"/>
+                </a:solidFill>
+              </a:rPr>
+              <a:t>Automated Alpha Attribute Selection</a:t>
+            </a:r>
+          </a:p>
+          <a:p>
+            <a:pPr marL="285750" indent="-285750">
+              <a:buFont typeface="Arial" panose="020B0604020202020204" pitchFamily="34" charset="0"/>
+              <a:buChar char="•"/>
+            </a:pPr>
+            <a:r>
+              <a:rPr lang="en-US" dirty="0">
+                <a:solidFill>
+                  <a:schemeClr val="tx1"/>
+                </a:solidFill>
+              </a:rPr>
+              <a:t>Rank Trace Attributes</a:t>
+            </a:r>
+          </a:p>
+          <a:p>
+            <a:pPr marL="285750" indent="-285750">
+              <a:buFont typeface="Arial" panose="020B0604020202020204" pitchFamily="34" charset="0"/>
+              <a:buChar char="•"/>
+            </a:pPr>
+            <a:r>
+              <a:rPr lang="en-US" dirty="0">
+                <a:solidFill>
+                  <a:schemeClr val="tx1"/>
+                </a:solidFill>
+              </a:rPr>
+              <a:t>Instantiating new Alpha 	Attributes</a:t>
+            </a:r>
+          </a:p>
+        </p:txBody>
+      </p:sp>
+      <p:sp>
+        <p:nvSpPr>
+          <p:cNvPr id="5" name="Round Diagonal Corner of Rectangle 4">
+            <a:extLst>
+              <a:ext uri="{FF2B5EF4-FFF2-40B4-BE49-F238E27FC236}">
+                <a16:creationId xmlns:a16="http://schemas.microsoft.com/office/drawing/2014/main" id="{42200D35-F917-8797-245A-E9BC2AF8DB53}"/>
+              </a:ext>
+            </a:extLst>
+          </p:cNvPr>
+          <p:cNvSpPr/>
+          <p:nvPr/>
+        </p:nvSpPr>
+        <p:spPr>
+          <a:xfrm>
+            <a:off x="5822902" y="2597264"/>
+            <a:ext cx="2768539" cy="1414594"/>
+          </a:xfrm>
+          <a:prstGeom prst="round2DiagRect">
+            <a:avLst/>
+          </a:prstGeom>
+        </p:spPr>
+        <p:style>
+          <a:lnRef idx="1">
+            <a:schemeClr val="dk1"/>
+          </a:lnRef>
+          <a:fillRef idx="2">
+            <a:schemeClr val="dk1"/>
+          </a:fillRef>
+          <a:effectRef idx="1">
+            <a:schemeClr val="dk1"/>
+          </a:effectRef>
+          <a:fontRef idx="minor">
+            <a:schemeClr val="dk1"/>
+          </a:fontRef>
+        </p:style>
+        <p:txBody>
+          <a:bodyPr rtlCol="0" anchor="ctr"/>
+          <a:lstStyle/>
+          <a:p>
+            <a:endParaRPr lang="en-US" b="1" dirty="0">
+              <a:solidFill>
+                <a:schemeClr val="tx1"/>
+              </a:solidFill>
+            </a:endParaRPr>
+          </a:p>
+          <a:p>
+            <a:r>
+              <a:rPr lang="en-US" b="1" dirty="0">
+                <a:solidFill>
+                  <a:schemeClr val="tx1"/>
+                </a:solidFill>
+              </a:rPr>
+              <a:t>In Depth Comparison</a:t>
+            </a:r>
+          </a:p>
+          <a:p>
+            <a:pPr marL="285750" indent="-285750">
+              <a:buFont typeface="Arial" panose="020B0604020202020204" pitchFamily="34" charset="0"/>
+              <a:buChar char="•"/>
+            </a:pPr>
+            <a:r>
+              <a:rPr lang="en-US" dirty="0">
+                <a:solidFill>
+                  <a:schemeClr val="tx1"/>
+                </a:solidFill>
+              </a:rPr>
+              <a:t>Stochastic insights into sub-log differences</a:t>
+            </a:r>
+          </a:p>
+          <a:p>
+            <a:endParaRPr lang="en-US" dirty="0"/>
+          </a:p>
+        </p:txBody>
+      </p:sp>
+      <p:sp>
+        <p:nvSpPr>
+          <p:cNvPr id="7" name="Round Diagonal Corner of Rectangle 6">
+            <a:extLst>
+              <a:ext uri="{FF2B5EF4-FFF2-40B4-BE49-F238E27FC236}">
+                <a16:creationId xmlns:a16="http://schemas.microsoft.com/office/drawing/2014/main" id="{994DF4A7-2050-9BD4-476E-F281E73693FA}"/>
+              </a:ext>
+            </a:extLst>
+          </p:cNvPr>
+          <p:cNvSpPr/>
+          <p:nvPr/>
+        </p:nvSpPr>
+        <p:spPr>
+          <a:xfrm>
+            <a:off x="9310792" y="2579826"/>
+            <a:ext cx="2768539" cy="1414594"/>
+          </a:xfrm>
+          <a:prstGeom prst="round2DiagRect">
+            <a:avLst/>
+          </a:prstGeom>
+        </p:spPr>
+        <p:style>
+          <a:lnRef idx="1">
+            <a:schemeClr val="dk1"/>
+          </a:lnRef>
+          <a:fillRef idx="2">
+            <a:schemeClr val="dk1"/>
+          </a:fillRef>
+          <a:effectRef idx="1">
+            <a:schemeClr val="dk1"/>
+          </a:effectRef>
+          <a:fontRef idx="minor">
+            <a:schemeClr val="dk1"/>
+          </a:fontRef>
+        </p:style>
+        <p:txBody>
+          <a:bodyPr rtlCol="0" anchor="ctr"/>
+          <a:lstStyle/>
+          <a:p>
+            <a:r>
+              <a:rPr lang="en-US" b="1" dirty="0">
+                <a:solidFill>
+                  <a:schemeClr val="tx1"/>
+                </a:solidFill>
+              </a:rPr>
+              <a:t>Identifying Comparable Sub-logs</a:t>
+            </a:r>
+          </a:p>
+          <a:p>
+            <a:pPr marL="342900" indent="-342900">
+              <a:buFont typeface="Arial" panose="020B0604020202020204" pitchFamily="34" charset="0"/>
+              <a:buChar char="•"/>
+            </a:pPr>
+            <a:r>
+              <a:rPr lang="en-US" dirty="0">
+                <a:solidFill>
+                  <a:schemeClr val="tx1"/>
+                </a:solidFill>
+              </a:rPr>
+              <a:t>Stochastic Clustering</a:t>
+            </a:r>
+          </a:p>
+          <a:p>
+            <a:pPr marL="342900" indent="-342900">
+              <a:buFont typeface="Arial" panose="020B0604020202020204" pitchFamily="34" charset="0"/>
+              <a:buChar char="•"/>
+            </a:pPr>
+            <a:r>
+              <a:rPr lang="en-US" dirty="0">
+                <a:solidFill>
+                  <a:schemeClr val="tx1"/>
+                </a:solidFill>
+              </a:rPr>
+              <a:t>Pair Comparison</a:t>
+            </a:r>
+          </a:p>
+        </p:txBody>
+      </p:sp>
+      <p:sp>
+        <p:nvSpPr>
+          <p:cNvPr id="13" name="Right Arrow 12">
+            <a:extLst>
+              <a:ext uri="{FF2B5EF4-FFF2-40B4-BE49-F238E27FC236}">
+                <a16:creationId xmlns:a16="http://schemas.microsoft.com/office/drawing/2014/main" id="{A283CC05-2DFE-DDE3-B977-ADF7F9B478AE}"/>
+              </a:ext>
+            </a:extLst>
+          </p:cNvPr>
+          <p:cNvSpPr/>
+          <p:nvPr/>
+        </p:nvSpPr>
+        <p:spPr>
+          <a:xfrm rot="5400000">
+            <a:off x="10532709" y="2130362"/>
+            <a:ext cx="483429" cy="259691"/>
+          </a:xfrm>
+          <a:prstGeom prst="rightArrow">
+            <a:avLst/>
+          </a:prstGeom>
+          <a:solidFill>
+            <a:schemeClr val="tx1"/>
+          </a:solidFill>
+        </p:spPr>
+        <p:style>
+          <a:lnRef idx="2">
+            <a:schemeClr val="accent1">
+              <a:shade val="50000"/>
+            </a:schemeClr>
+          </a:lnRef>
+          <a:fillRef idx="1">
+            <a:schemeClr val="accent1"/>
+          </a:fillRef>
+          <a:effectRef idx="0">
+            <a:schemeClr val="accent1"/>
+          </a:effectRef>
+          <a:fontRef idx="minor">
+            <a:schemeClr val="lt1"/>
+          </a:fontRef>
+        </p:style>
+        <p:txBody>
+          <a:bodyPr rtlCol="0" anchor="ctr"/>
+          <a:lstStyle/>
+          <a:p>
+            <a:pPr algn="ctr"/>
+            <a:endParaRPr lang="en-US"/>
+          </a:p>
+        </p:txBody>
+      </p:sp>
+      <p:sp>
+        <p:nvSpPr>
+          <p:cNvPr id="17" name="Right Arrow 16">
+            <a:extLst>
+              <a:ext uri="{FF2B5EF4-FFF2-40B4-BE49-F238E27FC236}">
+                <a16:creationId xmlns:a16="http://schemas.microsoft.com/office/drawing/2014/main" id="{153D0789-F124-FBDF-D9F3-F70B70E543C8}"/>
+              </a:ext>
+            </a:extLst>
+          </p:cNvPr>
+          <p:cNvSpPr/>
+          <p:nvPr/>
+        </p:nvSpPr>
+        <p:spPr>
+          <a:xfrm rot="10800000">
+            <a:off x="8709402" y="3191557"/>
+            <a:ext cx="483429" cy="214621"/>
+          </a:xfrm>
+          <a:prstGeom prst="rightArrow">
+            <a:avLst/>
+          </a:prstGeom>
+          <a:solidFill>
+            <a:schemeClr val="tx1"/>
+          </a:solidFill>
+        </p:spPr>
+        <p:style>
+          <a:lnRef idx="2">
+            <a:schemeClr val="accent1">
+              <a:shade val="50000"/>
+            </a:schemeClr>
+          </a:lnRef>
+          <a:fillRef idx="1">
+            <a:schemeClr val="accent1"/>
+          </a:fillRef>
+          <a:effectRef idx="0">
+            <a:schemeClr val="accent1"/>
+          </a:effectRef>
+          <a:fontRef idx="minor">
+            <a:schemeClr val="lt1"/>
+          </a:fontRef>
+        </p:style>
+        <p:txBody>
+          <a:bodyPr rtlCol="0" anchor="ctr"/>
+          <a:lstStyle/>
+          <a:p>
+            <a:pPr algn="ctr"/>
+            <a:endParaRPr lang="en-US"/>
+          </a:p>
+        </p:txBody>
+      </p:sp>
+      <p:sp>
+        <p:nvSpPr>
+          <p:cNvPr id="2" name="Rectangle 1">
+            <a:extLst>
+              <a:ext uri="{FF2B5EF4-FFF2-40B4-BE49-F238E27FC236}">
+                <a16:creationId xmlns:a16="http://schemas.microsoft.com/office/drawing/2014/main" id="{C26C5684-92F1-B2F0-A96F-7F3745D64D11}"/>
+              </a:ext>
+            </a:extLst>
+          </p:cNvPr>
+          <p:cNvSpPr/>
+          <p:nvPr/>
+        </p:nvSpPr>
+        <p:spPr>
+          <a:xfrm>
+            <a:off x="112669" y="2917721"/>
+            <a:ext cx="1256404" cy="773679"/>
+          </a:xfrm>
+          <a:prstGeom prst="rect">
+            <a:avLst/>
+          </a:prstGeom>
+        </p:spPr>
+        <p:style>
+          <a:lnRef idx="1">
+            <a:schemeClr val="accent3"/>
+          </a:lnRef>
+          <a:fillRef idx="2">
+            <a:schemeClr val="accent3"/>
+          </a:fillRef>
+          <a:effectRef idx="1">
+            <a:schemeClr val="accent3"/>
+          </a:effectRef>
+          <a:fontRef idx="minor">
+            <a:schemeClr val="dk1"/>
+          </a:fontRef>
+        </p:style>
+        <p:txBody>
+          <a:bodyPr rtlCol="0" anchor="ctr"/>
+          <a:lstStyle/>
+          <a:p>
+            <a:pPr algn="ctr"/>
+            <a:r>
+              <a:rPr lang="en-US" dirty="0">
+                <a:solidFill>
+                  <a:schemeClr val="tx1"/>
+                </a:solidFill>
+              </a:rPr>
+              <a:t>Results</a:t>
+            </a:r>
+          </a:p>
+        </p:txBody>
+      </p:sp>
+      <p:sp>
+        <p:nvSpPr>
+          <p:cNvPr id="3" name="Right Arrow 2">
+            <a:extLst>
+              <a:ext uri="{FF2B5EF4-FFF2-40B4-BE49-F238E27FC236}">
+                <a16:creationId xmlns:a16="http://schemas.microsoft.com/office/drawing/2014/main" id="{08AC0E77-E177-F872-0942-062A5D1187B4}"/>
+              </a:ext>
+            </a:extLst>
+          </p:cNvPr>
+          <p:cNvSpPr/>
+          <p:nvPr/>
+        </p:nvSpPr>
+        <p:spPr>
+          <a:xfrm>
+            <a:off x="4083477" y="1443592"/>
+            <a:ext cx="488943" cy="259693"/>
+          </a:xfrm>
+          <a:prstGeom prst="rightArrow">
+            <a:avLst/>
+          </a:prstGeom>
+          <a:solidFill>
+            <a:schemeClr val="tx1"/>
+          </a:solidFill>
+        </p:spPr>
+        <p:style>
+          <a:lnRef idx="2">
+            <a:schemeClr val="accent1">
+              <a:shade val="50000"/>
+            </a:schemeClr>
+          </a:lnRef>
+          <a:fillRef idx="1">
+            <a:schemeClr val="accent1"/>
+          </a:fillRef>
+          <a:effectRef idx="0">
+            <a:schemeClr val="accent1"/>
+          </a:effectRef>
+          <a:fontRef idx="minor">
+            <a:schemeClr val="lt1"/>
+          </a:fontRef>
+        </p:style>
+        <p:txBody>
+          <a:bodyPr rtlCol="0" anchor="ctr"/>
+          <a:lstStyle/>
+          <a:p>
+            <a:pPr algn="ctr"/>
+            <a:endParaRPr lang="en-US"/>
+          </a:p>
+        </p:txBody>
+      </p:sp>
+      <p:sp>
+        <p:nvSpPr>
+          <p:cNvPr id="9" name="Right Arrow 8">
+            <a:extLst>
+              <a:ext uri="{FF2B5EF4-FFF2-40B4-BE49-F238E27FC236}">
+                <a16:creationId xmlns:a16="http://schemas.microsoft.com/office/drawing/2014/main" id="{FE5798F3-0F53-D255-D413-9354B92005CA}"/>
+              </a:ext>
+            </a:extLst>
+          </p:cNvPr>
+          <p:cNvSpPr/>
+          <p:nvPr/>
+        </p:nvSpPr>
+        <p:spPr>
+          <a:xfrm>
+            <a:off x="5264657" y="1445160"/>
+            <a:ext cx="488943" cy="259693"/>
+          </a:xfrm>
+          <a:prstGeom prst="rightArrow">
+            <a:avLst/>
+          </a:prstGeom>
+          <a:solidFill>
+            <a:schemeClr val="tx1"/>
+          </a:solidFill>
+        </p:spPr>
+        <p:style>
+          <a:lnRef idx="2">
+            <a:schemeClr val="accent1">
+              <a:shade val="50000"/>
+            </a:schemeClr>
+          </a:lnRef>
+          <a:fillRef idx="1">
+            <a:schemeClr val="accent1"/>
+          </a:fillRef>
+          <a:effectRef idx="0">
+            <a:schemeClr val="accent1"/>
+          </a:effectRef>
+          <a:fontRef idx="minor">
+            <a:schemeClr val="lt1"/>
+          </a:fontRef>
+        </p:style>
+        <p:txBody>
+          <a:bodyPr rtlCol="0" anchor="ctr"/>
+          <a:lstStyle/>
+          <a:p>
+            <a:pPr algn="ctr"/>
+            <a:endParaRPr lang="en-US"/>
+          </a:p>
+        </p:txBody>
+      </p:sp>
+      <p:sp>
+        <p:nvSpPr>
+          <p:cNvPr id="16" name="Right Arrow 15">
+            <a:extLst>
+              <a:ext uri="{FF2B5EF4-FFF2-40B4-BE49-F238E27FC236}">
+                <a16:creationId xmlns:a16="http://schemas.microsoft.com/office/drawing/2014/main" id="{F6BAED02-87D7-612F-3CA7-5DB65BE6C490}"/>
+              </a:ext>
+            </a:extLst>
+          </p:cNvPr>
+          <p:cNvSpPr/>
+          <p:nvPr/>
+        </p:nvSpPr>
+        <p:spPr>
+          <a:xfrm>
+            <a:off x="8696575" y="1423663"/>
+            <a:ext cx="614217" cy="279622"/>
+          </a:xfrm>
+          <a:prstGeom prst="rightArrow">
+            <a:avLst/>
+          </a:prstGeom>
+          <a:solidFill>
+            <a:schemeClr val="tx1"/>
+          </a:solidFill>
+        </p:spPr>
+        <p:style>
+          <a:lnRef idx="2">
+            <a:schemeClr val="accent1">
+              <a:shade val="50000"/>
+            </a:schemeClr>
+          </a:lnRef>
+          <a:fillRef idx="1">
+            <a:schemeClr val="accent1"/>
+          </a:fillRef>
+          <a:effectRef idx="0">
+            <a:schemeClr val="accent1"/>
+          </a:effectRef>
+          <a:fontRef idx="minor">
+            <a:schemeClr val="lt1"/>
+          </a:fontRef>
+        </p:style>
+        <p:txBody>
+          <a:bodyPr rtlCol="0" anchor="ctr"/>
+          <a:lstStyle/>
+          <a:p>
+            <a:pPr algn="ctr"/>
+            <a:endParaRPr lang="en-US"/>
+          </a:p>
+        </p:txBody>
+      </p:sp>
+      <p:sp>
+        <p:nvSpPr>
+          <p:cNvPr id="18" name="Right Arrow 17">
+            <a:extLst>
+              <a:ext uri="{FF2B5EF4-FFF2-40B4-BE49-F238E27FC236}">
+                <a16:creationId xmlns:a16="http://schemas.microsoft.com/office/drawing/2014/main" id="{656A9AAD-5151-FF1E-614E-46A367600F1A}"/>
+              </a:ext>
+            </a:extLst>
+          </p:cNvPr>
+          <p:cNvSpPr/>
+          <p:nvPr/>
+        </p:nvSpPr>
+        <p:spPr>
+          <a:xfrm rot="10800000">
+            <a:off x="4592345" y="3192588"/>
+            <a:ext cx="856424" cy="214621"/>
+          </a:xfrm>
+          <a:prstGeom prst="rightArrow">
+            <a:avLst/>
+          </a:prstGeom>
+          <a:solidFill>
+            <a:schemeClr val="tx1"/>
+          </a:solidFill>
+        </p:spPr>
+        <p:style>
+          <a:lnRef idx="2">
+            <a:schemeClr val="accent1">
+              <a:shade val="50000"/>
+            </a:schemeClr>
+          </a:lnRef>
+          <a:fillRef idx="1">
+            <a:schemeClr val="accent1"/>
+          </a:fillRef>
+          <a:effectRef idx="0">
+            <a:schemeClr val="accent1"/>
+          </a:effectRef>
+          <a:fontRef idx="minor">
+            <a:schemeClr val="lt1"/>
+          </a:fontRef>
+        </p:style>
+        <p:txBody>
+          <a:bodyPr rtlCol="0" anchor="ctr"/>
+          <a:lstStyle/>
+          <a:p>
+            <a:pPr algn="ctr"/>
+            <a:endParaRPr lang="en-US"/>
+          </a:p>
+        </p:txBody>
+      </p:sp>
+      <p:sp>
+        <p:nvSpPr>
+          <p:cNvPr id="19" name="Right Arrow 18">
+            <a:extLst>
+              <a:ext uri="{FF2B5EF4-FFF2-40B4-BE49-F238E27FC236}">
+                <a16:creationId xmlns:a16="http://schemas.microsoft.com/office/drawing/2014/main" id="{FF6274EA-E6F6-5DCB-55E8-F18ADA221EDC}"/>
+              </a:ext>
+            </a:extLst>
+          </p:cNvPr>
+          <p:cNvSpPr/>
+          <p:nvPr/>
+        </p:nvSpPr>
+        <p:spPr>
+          <a:xfrm rot="10800000">
+            <a:off x="1446784" y="3185430"/>
+            <a:ext cx="531772" cy="214621"/>
+          </a:xfrm>
+          <a:prstGeom prst="rightArrow">
+            <a:avLst/>
+          </a:prstGeom>
+          <a:solidFill>
+            <a:schemeClr val="tx1"/>
+          </a:solidFill>
+        </p:spPr>
+        <p:style>
+          <a:lnRef idx="2">
+            <a:schemeClr val="accent1">
+              <a:shade val="50000"/>
+            </a:schemeClr>
+          </a:lnRef>
+          <a:fillRef idx="1">
+            <a:schemeClr val="accent1"/>
+          </a:fillRef>
+          <a:effectRef idx="0">
+            <a:schemeClr val="accent1"/>
+          </a:effectRef>
+          <a:fontRef idx="minor">
+            <a:schemeClr val="lt1"/>
+          </a:fontRef>
+        </p:style>
+        <p:txBody>
+          <a:bodyPr rtlCol="0" anchor="ctr"/>
+          <a:lstStyle/>
+          <a:p>
+            <a:pPr algn="ctr"/>
+            <a:endParaRPr lang="en-US"/>
+          </a:p>
+        </p:txBody>
+      </p:sp>
+    </p:spTree>
+    <p:extLst>
+      <p:ext uri="{BB962C8B-B14F-4D97-AF65-F5344CB8AC3E}">
+        <p14:creationId xmlns:p14="http://schemas.microsoft.com/office/powerpoint/2010/main" val="638970558"/>
+      </p:ext>
+    </p:extLst>
+  </p:cSld>
+  <p:clrMapOvr>
+    <a:masterClrMapping/>
+  </p:clrMapOvr>
+</p:sld>
+</file>
+
+<file path=ppt/slides/slide3.xml><?xml version="1.0" encoding="utf-8"?>
+<p:sld xmlns:a="http://schemas.openxmlformats.org/drawingml/2006/main" xmlns:r="http://schemas.openxmlformats.org/officeDocument/2006/relationships" xmlns:p="http://schemas.openxmlformats.org/presentationml/2006/main">
+  <p:cSld>
+    <p:spTree>
+      <p:nvGrpSpPr>
+        <p:cNvPr id="1" name=""/>
+        <p:cNvGrpSpPr/>
+        <p:nvPr/>
+      </p:nvGrpSpPr>
+      <p:grpSpPr>
+        <a:xfrm>
+          <a:off x="0" y="0"/>
+          <a:ext cx="0" cy="0"/>
+          <a:chOff x="0" y="0"/>
+          <a:chExt cx="0" cy="0"/>
+        </a:xfrm>
+      </p:grpSpPr>
+      <p:pic>
+        <p:nvPicPr>
+          <p:cNvPr id="6" name="Graphic 5" descr="Database outline">
+            <a:extLst>
+              <a:ext uri="{FF2B5EF4-FFF2-40B4-BE49-F238E27FC236}">
+                <a16:creationId xmlns:a16="http://schemas.microsoft.com/office/drawing/2014/main" id="{EC56AB9D-7CB7-0505-6D85-5BF483485889}"/>
+              </a:ext>
+            </a:extLst>
+          </p:cNvPr>
+          <p:cNvPicPr>
+            <a:picLocks noChangeAspect="1"/>
+          </p:cNvPicPr>
+          <p:nvPr/>
+        </p:nvPicPr>
+        <p:blipFill>
+          <a:blip r:embed="rId2">
+            <a:extLst>
+              <a:ext uri="{96DAC541-7B7A-43D3-8B79-37D633B846F1}">
+                <asvg:svgBlip xmlns:asvg="http://schemas.microsoft.com/office/drawing/2016/SVG/main" r:embed="rId3"/>
+              </a:ext>
+            </a:extLst>
+          </a:blip>
+          <a:stretch>
+            <a:fillRect/>
+          </a:stretch>
+        </p:blipFill>
+        <p:spPr>
+          <a:xfrm>
             <a:off x="481006" y="795338"/>
             <a:ext cx="1081088" cy="1081088"/>
           </a:xfrm>
@@ -5066,7 +7090,7 @@
     </p:spTree>
     <p:extLst>
       <p:ext uri="{BB962C8B-B14F-4D97-AF65-F5344CB8AC3E}">
-        <p14:creationId xmlns:p14="http://schemas.microsoft.com/office/powerpoint/2010/main" val="1860000131"/>
+        <p14:creationId xmlns:p14="http://schemas.microsoft.com/office/powerpoint/2010/main" val="3065300836"/>
       </p:ext>
     </p:extLst>
   </p:cSld>
@@ -5076,7 +7100,87 @@
 </p:sld>
 </file>
 
-<file path=ppt/slides/slide2.xml><?xml version="1.0" encoding="utf-8"?>
+<file path=ppt/slides/slide4.xml><?xml version="1.0" encoding="utf-8"?>
+<p:sld xmlns:a="http://schemas.openxmlformats.org/drawingml/2006/main" xmlns:r="http://schemas.openxmlformats.org/officeDocument/2006/relationships" xmlns:p="http://schemas.openxmlformats.org/presentationml/2006/main">
+  <p:cSld>
+    <p:spTree>
+      <p:nvGrpSpPr>
+        <p:cNvPr id="1" name=""/>
+        <p:cNvGrpSpPr/>
+        <p:nvPr/>
+      </p:nvGrpSpPr>
+      <p:grpSpPr>
+        <a:xfrm>
+          <a:off x="0" y="0"/>
+          <a:ext cx="0" cy="0"/>
+          <a:chOff x="0" y="0"/>
+          <a:chExt cx="0" cy="0"/>
+        </a:xfrm>
+      </p:grpSpPr>
+      <p:sp>
+        <p:nvSpPr>
+          <p:cNvPr id="2" name="Title 1">
+            <a:extLst>
+              <a:ext uri="{FF2B5EF4-FFF2-40B4-BE49-F238E27FC236}">
+                <a16:creationId xmlns:a16="http://schemas.microsoft.com/office/drawing/2014/main" id="{D4D970D1-169B-C01F-71D5-14AD83926764}"/>
+              </a:ext>
+            </a:extLst>
+          </p:cNvPr>
+          <p:cNvSpPr>
+            <a:spLocks noGrp="1"/>
+          </p:cNvSpPr>
+          <p:nvPr>
+            <p:ph type="title"/>
+          </p:nvPr>
+        </p:nvSpPr>
+        <p:spPr/>
+        <p:txBody>
+          <a:bodyPr/>
+          <a:lstStyle/>
+          <a:p>
+            <a:endParaRPr lang="en-US"/>
+          </a:p>
+        </p:txBody>
+      </p:sp>
+      <p:sp>
+        <p:nvSpPr>
+          <p:cNvPr id="3" name="Content Placeholder 2">
+            <a:extLst>
+              <a:ext uri="{FF2B5EF4-FFF2-40B4-BE49-F238E27FC236}">
+                <a16:creationId xmlns:a16="http://schemas.microsoft.com/office/drawing/2014/main" id="{C6CF7C29-C042-B670-74F4-B8CFA34A1C5F}"/>
+              </a:ext>
+            </a:extLst>
+          </p:cNvPr>
+          <p:cNvSpPr>
+            <a:spLocks noGrp="1"/>
+          </p:cNvSpPr>
+          <p:nvPr>
+            <p:ph idx="1"/>
+          </p:nvPr>
+        </p:nvSpPr>
+        <p:spPr/>
+        <p:txBody>
+          <a:bodyPr/>
+          <a:lstStyle/>
+          <a:p>
+            <a:endParaRPr lang="en-US"/>
+          </a:p>
+        </p:txBody>
+      </p:sp>
+    </p:spTree>
+    <p:extLst>
+      <p:ext uri="{BB962C8B-B14F-4D97-AF65-F5344CB8AC3E}">
+        <p14:creationId xmlns:p14="http://schemas.microsoft.com/office/powerpoint/2010/main" val="1839270716"/>
+      </p:ext>
+    </p:extLst>
+  </p:cSld>
+  <p:clrMapOvr>
+    <a:masterClrMapping/>
+  </p:clrMapOvr>
+</p:sld>
+</file>
+
+<file path=ppt/slides/slide5.xml><?xml version="1.0" encoding="utf-8"?>
 <p:sld xmlns:a="http://schemas.openxmlformats.org/drawingml/2006/main" xmlns:r="http://schemas.openxmlformats.org/officeDocument/2006/relationships" xmlns:p="http://schemas.openxmlformats.org/presentationml/2006/main">
   <p:cSld>
     <p:spTree>

</xml_diff>

<commit_message>
Updated PCM image with new suggestions
</commit_message>
<xml_diff>
--- a/Documents/P2CM diagrams.pptx
+++ b/Documents/P2CM diagrams.pptx
@@ -5072,8 +5072,8 @@
         </p:nvSpPr>
         <p:spPr>
           <a:xfrm>
-            <a:off x="2145228" y="2817134"/>
-            <a:ext cx="2103519" cy="914400"/>
+            <a:off x="2409838" y="2576702"/>
+            <a:ext cx="2219120" cy="1114698"/>
           </a:xfrm>
           <a:prstGeom prst="roundRect">
             <a:avLst/>
@@ -5199,8 +5199,8 @@
         </p:nvSpPr>
         <p:spPr>
           <a:xfrm>
-            <a:off x="5784352" y="770653"/>
-            <a:ext cx="2768539" cy="1414594"/>
+            <a:off x="5863147" y="847023"/>
+            <a:ext cx="2579425" cy="1432902"/>
           </a:xfrm>
           <a:prstGeom prst="round2DiagRect">
             <a:avLst/>
@@ -5244,7 +5244,7 @@
                   <a:schemeClr val="tx1"/>
                 </a:solidFill>
               </a:rPr>
-              <a:t>Rank Trace Attributes</a:t>
+              <a:t>Rank trace attributes</a:t>
             </a:r>
           </a:p>
           <a:p>
@@ -5258,7 +5258,7 @@
                   <a:schemeClr val="tx1"/>
                 </a:solidFill>
               </a:rPr>
-              <a:t>Instantiating new Alpha 	Attributes</a:t>
+              <a:t>Instantiating new alpha attributes</a:t>
             </a:r>
           </a:p>
         </p:txBody>
@@ -5277,8 +5277,8 @@
         </p:nvSpPr>
         <p:spPr>
           <a:xfrm>
-            <a:off x="5822902" y="2597264"/>
-            <a:ext cx="2768539" cy="1414594"/>
+            <a:off x="5609778" y="2597264"/>
+            <a:ext cx="2768539" cy="1094136"/>
           </a:xfrm>
           <a:prstGeom prst="round2DiagRect">
             <a:avLst/>
@@ -5302,20 +5302,13 @@
           <a:bodyPr rtlCol="0" anchor="ctr"/>
           <a:lstStyle/>
           <a:p>
-            <a:endParaRPr lang="en-US" b="1" dirty="0">
-              <a:solidFill>
-                <a:schemeClr val="tx1"/>
-              </a:solidFill>
-            </a:endParaRPr>
-          </a:p>
-          <a:p>
             <a:r>
               <a:rPr lang="en-US" b="1" dirty="0">
                 <a:solidFill>
                   <a:schemeClr val="tx1"/>
                 </a:solidFill>
               </a:rPr>
-              <a:t>In Depth Comparison</a:t>
+              <a:t>In-Depth Comparison</a:t>
             </a:r>
           </a:p>
           <a:p>
@@ -5352,7 +5345,7 @@
         <p:spPr>
           <a:xfrm>
             <a:off x="9310792" y="2579826"/>
-            <a:ext cx="2768539" cy="1414594"/>
+            <a:ext cx="2768539" cy="1151708"/>
           </a:xfrm>
           <a:prstGeom prst="round2DiagRect">
             <a:avLst/>
@@ -5382,7 +5375,7 @@
                   <a:schemeClr val="tx1"/>
                 </a:solidFill>
               </a:rPr>
-              <a:t>Identifying Comparable Sub-logs</a:t>
+              <a:t>Identifying Comparable sub-Logs</a:t>
             </a:r>
           </a:p>
           <a:p>
@@ -5396,7 +5389,7 @@
                   <a:schemeClr val="tx1"/>
                 </a:solidFill>
               </a:rPr>
-              <a:t>Stochastic Clustering</a:t>
+              <a:t>Stochastic clustering</a:t>
             </a:r>
           </a:p>
           <a:p>
@@ -5410,7 +5403,7 @@
                   <a:schemeClr val="tx1"/>
                 </a:solidFill>
               </a:rPr>
-              <a:t>Pair Comparison</a:t>
+              <a:t>Pair comparison</a:t>
             </a:r>
           </a:p>
         </p:txBody>
@@ -5478,7 +5471,7 @@
         </p:nvSpPr>
         <p:spPr>
           <a:xfrm rot="10800000">
-            <a:off x="8709402" y="3191557"/>
+            <a:off x="8602841" y="3062917"/>
             <a:ext cx="483429" cy="214621"/>
           </a:xfrm>
           <a:prstGeom prst="rightArrow">
@@ -5527,8 +5520,8 @@
         </p:nvSpPr>
         <p:spPr>
           <a:xfrm>
-            <a:off x="112669" y="2917721"/>
-            <a:ext cx="1256404" cy="773679"/>
+            <a:off x="140814" y="2647062"/>
+            <a:ext cx="1288204" cy="1044338"/>
           </a:xfrm>
           <a:prstGeom prst="rect">
             <a:avLst/>
@@ -5676,8 +5669,8 @@
         </p:nvSpPr>
         <p:spPr>
           <a:xfrm>
-            <a:off x="8696575" y="1423663"/>
-            <a:ext cx="614217" cy="279622"/>
+            <a:off x="8724494" y="1436373"/>
+            <a:ext cx="558379" cy="254202"/>
           </a:xfrm>
           <a:prstGeom prst="rightArrow">
             <a:avLst/>
@@ -5725,8 +5718,8 @@
         </p:nvSpPr>
         <p:spPr>
           <a:xfrm rot="10800000">
-            <a:off x="4592345" y="3192588"/>
-            <a:ext cx="856424" cy="214621"/>
+            <a:off x="4853482" y="3063948"/>
+            <a:ext cx="531772" cy="214621"/>
           </a:xfrm>
           <a:prstGeom prst="rightArrow">
             <a:avLst/>
@@ -5774,7 +5767,7 @@
         </p:nvSpPr>
         <p:spPr>
           <a:xfrm rot="10800000">
-            <a:off x="1446784" y="3185430"/>
+            <a:off x="1653542" y="3062917"/>
             <a:ext cx="531772" cy="214621"/>
           </a:xfrm>
           <a:prstGeom prst="rightArrow">

</xml_diff>